<commit_message>
added demos to troubleshooting
</commit_message>
<xml_diff>
--- a/kubernetes/06_troubleshooting.pptx
+++ b/kubernetes/06_troubleshooting.pptx
@@ -5,10 +5,10 @@
     <p:sldMasterId id="2147483733" r:id="rId1"/>
   </p:sldMasterIdLst>
   <p:notesMasterIdLst>
-    <p:notesMasterId r:id="rId11"/>
+    <p:notesMasterId r:id="rId13"/>
   </p:notesMasterIdLst>
   <p:handoutMasterIdLst>
-    <p:handoutMasterId r:id="rId12"/>
+    <p:handoutMasterId r:id="rId14"/>
   </p:handoutMasterIdLst>
   <p:sldIdLst>
     <p:sldId id="433" r:id="rId2"/>
@@ -17,9 +17,11 @@
     <p:sldId id="453" r:id="rId5"/>
     <p:sldId id="455" r:id="rId6"/>
     <p:sldId id="457" r:id="rId7"/>
-    <p:sldId id="458" r:id="rId8"/>
-    <p:sldId id="456" r:id="rId9"/>
-    <p:sldId id="265" r:id="rId10"/>
+    <p:sldId id="459" r:id="rId8"/>
+    <p:sldId id="458" r:id="rId9"/>
+    <p:sldId id="456" r:id="rId10"/>
+    <p:sldId id="460" r:id="rId11"/>
+    <p:sldId id="265" r:id="rId12"/>
   </p:sldIdLst>
   <p:sldSz cx="12195175" cy="6858000"/>
   <p:notesSz cx="6858000" cy="9144000"/>
@@ -195,10 +197,6 @@
 </p:presentation>
 </file>
 
-<file path=ppt/revisionInfo.xml><?xml version="1.0" encoding="utf-8"?>
-<p1510:revInfo xmlns:a="http://schemas.openxmlformats.org/drawingml/2006/main" xmlns:r="http://schemas.openxmlformats.org/officeDocument/2006/relationships" xmlns:p1510="http://schemas.microsoft.com/office/powerpoint/2015/10/main"/>
-</file>
-
 <file path=ppt/handoutMasters/handoutMaster1.xml><?xml version="1.0" encoding="utf-8"?>
 <p:handoutMaster xmlns:a="http://schemas.openxmlformats.org/drawingml/2006/main" xmlns:r="http://schemas.openxmlformats.org/officeDocument/2006/relationships" xmlns:p="http://schemas.openxmlformats.org/presentationml/2006/main">
   <p:cSld>
@@ -612,6 +610,425 @@
 </p:notes>
 </file>
 
+<file path=ppt/notesSlides/notesSlide10.xml><?xml version="1.0" encoding="utf-8"?>
+<p:notes xmlns:a="http://schemas.openxmlformats.org/drawingml/2006/main" xmlns:r="http://schemas.openxmlformats.org/officeDocument/2006/relationships" xmlns:p="http://schemas.openxmlformats.org/presentationml/2006/main">
+  <p:cSld>
+    <p:spTree>
+      <p:nvGrpSpPr>
+        <p:cNvPr id="1" name=""/>
+        <p:cNvGrpSpPr/>
+        <p:nvPr/>
+      </p:nvGrpSpPr>
+      <p:grpSpPr>
+        <a:xfrm>
+          <a:off x="0" y="0"/>
+          <a:ext cx="0" cy="0"/>
+          <a:chOff x="0" y="0"/>
+          <a:chExt cx="0" cy="0"/>
+        </a:xfrm>
+      </p:grpSpPr>
+      <p:sp>
+        <p:nvSpPr>
+          <p:cNvPr id="2" name="Slide Image Placeholder 1"/>
+          <p:cNvSpPr>
+            <a:spLocks noGrp="1" noRot="1" noChangeAspect="1"/>
+          </p:cNvSpPr>
+          <p:nvPr>
+            <p:ph type="sldImg"/>
+          </p:nvPr>
+        </p:nvSpPr>
+        <p:spPr/>
+      </p:sp>
+      <p:sp>
+        <p:nvSpPr>
+          <p:cNvPr id="3" name="Notes Placeholder 2"/>
+          <p:cNvSpPr>
+            <a:spLocks noGrp="1"/>
+          </p:cNvSpPr>
+          <p:nvPr>
+            <p:ph type="body" idx="1"/>
+          </p:nvPr>
+        </p:nvSpPr>
+        <p:spPr/>
+        <p:txBody>
+          <a:bodyPr/>
+          <a:lstStyle/>
+          <a:p>
+            <a:pPr marL="285750" marR="0" lvl="0" indent="-285750" algn="l" defTabSz="1088776" rtl="0" eaLnBrk="1" fontAlgn="auto" latinLnBrk="0" hangingPunct="1">
+              <a:lnSpc>
+                <a:spcPct val="100000"/>
+              </a:lnSpc>
+              <a:spcBef>
+                <a:spcPts val="0"/>
+              </a:spcBef>
+              <a:spcAft>
+                <a:spcPts val="0"/>
+              </a:spcAft>
+              <a:buClrTx/>
+              <a:buSzTx/>
+              <a:buFont typeface="Symbol" panose="05050102010706020507" pitchFamily="18" charset="2"/>
+              <a:buChar char="-"/>
+              <a:tabLst/>
+              <a:defRPr/>
+            </a:pPr>
+            <a:r>
+              <a:rPr lang="en-US" baseline="0" dirty="0"/>
+              <a:t>This demo is about services and how they relate to endpoints.</a:t>
+            </a:r>
+          </a:p>
+          <a:p>
+            <a:pPr marL="285750" marR="0" lvl="0" indent="-285750" algn="l" defTabSz="1088776" rtl="0" eaLnBrk="1" fontAlgn="auto" latinLnBrk="0" hangingPunct="1">
+              <a:lnSpc>
+                <a:spcPct val="100000"/>
+              </a:lnSpc>
+              <a:spcBef>
+                <a:spcPts val="0"/>
+              </a:spcBef>
+              <a:spcAft>
+                <a:spcPts val="0"/>
+              </a:spcAft>
+              <a:buClrTx/>
+              <a:buSzTx/>
+              <a:buFont typeface="Symbol" panose="05050102010706020507" pitchFamily="18" charset="2"/>
+              <a:buChar char="-"/>
+              <a:tabLst/>
+              <a:defRPr/>
+            </a:pPr>
+            <a:endParaRPr lang="en-US" baseline="0" dirty="0"/>
+          </a:p>
+          <a:p>
+            <a:pPr marL="342900" marR="0" lvl="0" indent="-342900" algn="l" defTabSz="1088776" rtl="0" eaLnBrk="1" fontAlgn="auto" latinLnBrk="0" hangingPunct="1">
+              <a:lnSpc>
+                <a:spcPct val="100000"/>
+              </a:lnSpc>
+              <a:spcBef>
+                <a:spcPts val="0"/>
+              </a:spcBef>
+              <a:spcAft>
+                <a:spcPts val="0"/>
+              </a:spcAft>
+              <a:buClrTx/>
+              <a:buSzTx/>
+              <a:buFont typeface="Symbol" panose="05050102010706020507" pitchFamily="18" charset="2"/>
+              <a:buChar char="-"/>
+              <a:tabLst/>
+              <a:defRPr/>
+            </a:pPr>
+            <a:r>
+              <a:rPr lang="en-US" baseline="0" dirty="0"/>
+              <a:t>Start by deploying 06c_service_issues.yaml</a:t>
+            </a:r>
+          </a:p>
+          <a:p>
+            <a:pPr marL="342900" marR="0" lvl="0" indent="-342900" algn="l" defTabSz="1088776" rtl="0" eaLnBrk="1" fontAlgn="auto" latinLnBrk="0" hangingPunct="1">
+              <a:lnSpc>
+                <a:spcPct val="100000"/>
+              </a:lnSpc>
+              <a:spcBef>
+                <a:spcPts val="0"/>
+              </a:spcBef>
+              <a:spcAft>
+                <a:spcPts val="0"/>
+              </a:spcAft>
+              <a:buClrTx/>
+              <a:buSzTx/>
+              <a:buFont typeface="Symbol" panose="05050102010706020507" pitchFamily="18" charset="2"/>
+              <a:buChar char="-"/>
+              <a:tabLst/>
+              <a:defRPr/>
+            </a:pPr>
+            <a:r>
+              <a:rPr lang="en-US" baseline="0" dirty="0">
+                <a:sym typeface="Wingdings" panose="05000000000000000000" pitchFamily="2" charset="2"/>
+              </a:rPr>
+              <a:t>Get the public IP of the service and open it in a browser</a:t>
+            </a:r>
+          </a:p>
+          <a:p>
+            <a:pPr marL="342900" marR="0" lvl="0" indent="-342900" algn="l" defTabSz="1088776" rtl="0" eaLnBrk="1" fontAlgn="auto" latinLnBrk="0" hangingPunct="1">
+              <a:lnSpc>
+                <a:spcPct val="100000"/>
+              </a:lnSpc>
+              <a:spcBef>
+                <a:spcPts val="0"/>
+              </a:spcBef>
+              <a:spcAft>
+                <a:spcPts val="0"/>
+              </a:spcAft>
+              <a:buClrTx/>
+              <a:buSzTx/>
+              <a:buFont typeface="Symbol" panose="05050102010706020507" pitchFamily="18" charset="2"/>
+              <a:buChar char="-"/>
+              <a:tabLst/>
+              <a:defRPr/>
+            </a:pPr>
+            <a:r>
+              <a:rPr lang="en-US" baseline="0" dirty="0">
+                <a:sym typeface="Wingdings" panose="05000000000000000000" pitchFamily="2" charset="2"/>
+              </a:rPr>
+              <a:t>The answer should be something like “this site can’t be reached”</a:t>
+            </a:r>
+          </a:p>
+          <a:p>
+            <a:pPr marL="342900" marR="0" lvl="0" indent="-342900" algn="l" defTabSz="1088776" rtl="0" eaLnBrk="1" fontAlgn="auto" latinLnBrk="0" hangingPunct="1">
+              <a:lnSpc>
+                <a:spcPct val="100000"/>
+              </a:lnSpc>
+              <a:spcBef>
+                <a:spcPts val="0"/>
+              </a:spcBef>
+              <a:spcAft>
+                <a:spcPts val="0"/>
+              </a:spcAft>
+              <a:buClrTx/>
+              <a:buSzTx/>
+              <a:buFont typeface="Symbol" panose="05050102010706020507" pitchFamily="18" charset="2"/>
+              <a:buChar char="-"/>
+              <a:tabLst/>
+              <a:defRPr/>
+            </a:pPr>
+            <a:r>
+              <a:rPr lang="en-US" baseline="0" dirty="0"/>
+              <a:t>Show the service with describe </a:t>
+            </a:r>
+            <a:r>
+              <a:rPr lang="en-US" baseline="0" dirty="0">
+                <a:sym typeface="Wingdings" panose="05000000000000000000" pitchFamily="2" charset="2"/>
+              </a:rPr>
+              <a:t> highlight the empty “endpoints” list</a:t>
+            </a:r>
+          </a:p>
+          <a:p>
+            <a:pPr marL="342900" marR="0" lvl="0" indent="-342900" algn="l" defTabSz="1088776" rtl="0" eaLnBrk="1" fontAlgn="auto" latinLnBrk="0" hangingPunct="1">
+              <a:lnSpc>
+                <a:spcPct val="100000"/>
+              </a:lnSpc>
+              <a:spcBef>
+                <a:spcPts val="0"/>
+              </a:spcBef>
+              <a:spcAft>
+                <a:spcPts val="0"/>
+              </a:spcAft>
+              <a:buClrTx/>
+              <a:buSzTx/>
+              <a:buFont typeface="Symbol" panose="05050102010706020507" pitchFamily="18" charset="2"/>
+              <a:buChar char="-"/>
+              <a:tabLst/>
+              <a:defRPr/>
+            </a:pPr>
+            <a:r>
+              <a:rPr lang="en-US" baseline="0" dirty="0"/>
+              <a:t>Scale the deployment up to 3 and reload the page to display the welcome text</a:t>
+            </a:r>
+          </a:p>
+          <a:p>
+            <a:pPr marL="342900" marR="0" lvl="0" indent="-342900" algn="l" defTabSz="1088776" rtl="0" eaLnBrk="1" fontAlgn="auto" latinLnBrk="0" hangingPunct="1">
+              <a:lnSpc>
+                <a:spcPct val="100000"/>
+              </a:lnSpc>
+              <a:spcBef>
+                <a:spcPts val="0"/>
+              </a:spcBef>
+              <a:spcAft>
+                <a:spcPts val="0"/>
+              </a:spcAft>
+              <a:buClrTx/>
+              <a:buSzTx/>
+              <a:buFont typeface="Symbol" panose="05050102010706020507" pitchFamily="18" charset="2"/>
+              <a:buChar char="-"/>
+              <a:tabLst/>
+              <a:defRPr/>
+            </a:pPr>
+            <a:r>
+              <a:rPr lang="en-US" baseline="0" dirty="0"/>
+              <a:t>Again, describe the service and show the endpoints list</a:t>
+            </a:r>
+          </a:p>
+          <a:p>
+            <a:pPr marL="342900" marR="0" lvl="0" indent="-342900" algn="l" defTabSz="1088776" rtl="0" eaLnBrk="1" fontAlgn="auto" latinLnBrk="0" hangingPunct="1">
+              <a:lnSpc>
+                <a:spcPct val="100000"/>
+              </a:lnSpc>
+              <a:spcBef>
+                <a:spcPts val="0"/>
+              </a:spcBef>
+              <a:spcAft>
+                <a:spcPts val="0"/>
+              </a:spcAft>
+              <a:buClrTx/>
+              <a:buSzTx/>
+              <a:buFont typeface="Symbol" panose="05050102010706020507" pitchFamily="18" charset="2"/>
+              <a:buChar char="-"/>
+              <a:tabLst/>
+              <a:defRPr/>
+            </a:pPr>
+            <a:r>
+              <a:rPr lang="en-US" baseline="0" dirty="0"/>
+              <a:t>Next, run the selection query of the service manually: </a:t>
+            </a:r>
+            <a:r>
+              <a:rPr lang="en-US" baseline="0" dirty="0" err="1"/>
+              <a:t>kubectl</a:t>
+            </a:r>
+            <a:r>
+              <a:rPr lang="en-US" baseline="0" dirty="0"/>
+              <a:t> get pods -l tier=web-frontend -o wide</a:t>
+            </a:r>
+          </a:p>
+          <a:p>
+            <a:pPr marL="342900" marR="0" lvl="0" indent="-342900" algn="l" defTabSz="1088776" rtl="0" eaLnBrk="1" fontAlgn="auto" latinLnBrk="0" hangingPunct="1">
+              <a:lnSpc>
+                <a:spcPct val="100000"/>
+              </a:lnSpc>
+              <a:spcBef>
+                <a:spcPts val="0"/>
+              </a:spcBef>
+              <a:spcAft>
+                <a:spcPts val="0"/>
+              </a:spcAft>
+              <a:buClrTx/>
+              <a:buSzTx/>
+              <a:buFont typeface="Symbol" panose="05050102010706020507" pitchFamily="18" charset="2"/>
+              <a:buChar char="-"/>
+              <a:tabLst/>
+              <a:defRPr/>
+            </a:pPr>
+            <a:r>
+              <a:rPr lang="en-US" baseline="0" dirty="0"/>
+              <a:t>The IP addresses of the pods and the service endpoints should match</a:t>
+            </a:r>
+          </a:p>
+        </p:txBody>
+      </p:sp>
+      <p:sp>
+        <p:nvSpPr>
+          <p:cNvPr id="4" name="Slide Number Placeholder 3"/>
+          <p:cNvSpPr>
+            <a:spLocks noGrp="1"/>
+          </p:cNvSpPr>
+          <p:nvPr>
+            <p:ph type="sldNum" sz="quarter" idx="10"/>
+          </p:nvPr>
+        </p:nvSpPr>
+        <p:spPr/>
+        <p:txBody>
+          <a:bodyPr/>
+          <a:lstStyle/>
+          <a:p>
+            <a:fld id="{7D8C2C35-2B8A-446E-BEC0-FD36716C29AC}" type="slidenum">
+              <a:rPr lang="de-DE" smtClean="0"/>
+              <a:pPr/>
+              <a:t>10</a:t>
+            </a:fld>
+            <a:endParaRPr lang="de-DE" dirty="0"/>
+          </a:p>
+        </p:txBody>
+      </p:sp>
+    </p:spTree>
+    <p:extLst>
+      <p:ext uri="{BB962C8B-B14F-4D97-AF65-F5344CB8AC3E}">
+        <p14:creationId xmlns:p14="http://schemas.microsoft.com/office/powerpoint/2010/main" val="1853254739"/>
+      </p:ext>
+    </p:extLst>
+  </p:cSld>
+  <p:clrMapOvr>
+    <a:masterClrMapping/>
+  </p:clrMapOvr>
+</p:notes>
+</file>
+
+<file path=ppt/notesSlides/notesSlide11.xml><?xml version="1.0" encoding="utf-8"?>
+<p:notes xmlns:a="http://schemas.openxmlformats.org/drawingml/2006/main" xmlns:r="http://schemas.openxmlformats.org/officeDocument/2006/relationships" xmlns:p="http://schemas.openxmlformats.org/presentationml/2006/main">
+  <p:cSld>
+    <p:spTree>
+      <p:nvGrpSpPr>
+        <p:cNvPr id="1" name=""/>
+        <p:cNvGrpSpPr/>
+        <p:nvPr/>
+      </p:nvGrpSpPr>
+      <p:grpSpPr>
+        <a:xfrm>
+          <a:off x="0" y="0"/>
+          <a:ext cx="0" cy="0"/>
+          <a:chOff x="0" y="0"/>
+          <a:chExt cx="0" cy="0"/>
+        </a:xfrm>
+      </p:grpSpPr>
+      <p:sp>
+        <p:nvSpPr>
+          <p:cNvPr id="4" name="Slide Number Placeholder 3"/>
+          <p:cNvSpPr>
+            <a:spLocks noGrp="1"/>
+          </p:cNvSpPr>
+          <p:nvPr>
+            <p:ph type="sldNum" sz="quarter" idx="10"/>
+          </p:nvPr>
+        </p:nvSpPr>
+        <p:spPr/>
+        <p:txBody>
+          <a:bodyPr/>
+          <a:lstStyle/>
+          <a:p>
+            <a:fld id="{7D8C2C35-2B8A-446E-BEC0-FD36716C29AC}" type="slidenum">
+              <a:rPr lang="en-US" smtClean="0"/>
+              <a:pPr/>
+              <a:t>11</a:t>
+            </a:fld>
+            <a:endParaRPr lang="en-US" dirty="0"/>
+          </a:p>
+        </p:txBody>
+      </p:sp>
+      <p:sp>
+        <p:nvSpPr>
+          <p:cNvPr id="6" name="Slide Image Placeholder 5"/>
+          <p:cNvSpPr>
+            <a:spLocks noGrp="1" noRot="1" noChangeAspect="1"/>
+          </p:cNvSpPr>
+          <p:nvPr>
+            <p:ph type="sldImg"/>
+          </p:nvPr>
+        </p:nvSpPr>
+        <p:spPr>
+          <a:xfrm>
+            <a:off x="547688" y="612775"/>
+            <a:ext cx="5762625" cy="3241675"/>
+          </a:xfrm>
+        </p:spPr>
+      </p:sp>
+      <p:sp>
+        <p:nvSpPr>
+          <p:cNvPr id="7" name="Notes Placeholder 6"/>
+          <p:cNvSpPr>
+            <a:spLocks noGrp="1"/>
+          </p:cNvSpPr>
+          <p:nvPr>
+            <p:ph type="body" idx="1"/>
+          </p:nvPr>
+        </p:nvSpPr>
+        <p:spPr/>
+        <p:txBody>
+          <a:bodyPr>
+            <a:normAutofit/>
+          </a:bodyPr>
+          <a:lstStyle/>
+          <a:p>
+            <a:endParaRPr lang="en-US" dirty="0"/>
+          </a:p>
+        </p:txBody>
+      </p:sp>
+    </p:spTree>
+    <p:extLst>
+      <p:ext uri="{BB962C8B-B14F-4D97-AF65-F5344CB8AC3E}">
+        <p14:creationId xmlns:p14="http://schemas.microsoft.com/office/powerpoint/2010/main" val="2544264309"/>
+      </p:ext>
+    </p:extLst>
+  </p:cSld>
+  <p:clrMapOvr>
+    <a:masterClrMapping/>
+  </p:clrMapOvr>
+</p:notes>
+</file>
+
 <file path=ppt/notesSlides/notesSlide2.xml><?xml version="1.0" encoding="utf-8"?>
 <p:notes xmlns:a="http://schemas.openxmlformats.org/drawingml/2006/main" xmlns:r="http://schemas.openxmlformats.org/officeDocument/2006/relationships" xmlns:p="http://schemas.openxmlformats.org/presentationml/2006/main">
   <p:cSld>
@@ -1225,33 +1642,432 @@
           <a:bodyPr/>
           <a:lstStyle/>
           <a:p>
-            <a:r>
-              <a:rPr lang="en-US" dirty="0"/>
-              <a:t>In case something does not work as expected:</a:t>
-            </a:r>
-          </a:p>
-          <a:p>
-            <a:pPr marL="342900" indent="-342900">
-              <a:buAutoNum type="arabicParenR"/>
+            <a:pPr marL="285750" marR="0" lvl="0" indent="-285750" algn="l" defTabSz="1088776" rtl="0" eaLnBrk="1" fontAlgn="auto" latinLnBrk="0" hangingPunct="1">
+              <a:lnSpc>
+                <a:spcPct val="100000"/>
+              </a:lnSpc>
+              <a:spcBef>
+                <a:spcPts val="0"/>
+              </a:spcBef>
+              <a:spcAft>
+                <a:spcPts val="0"/>
+              </a:spcAft>
+              <a:buClrTx/>
+              <a:buSzTx/>
+              <a:buFontTx/>
+              <a:buChar char="-"/>
+              <a:tabLst/>
+              <a:defRPr/>
             </a:pPr>
             <a:r>
-              <a:rPr lang="en-US" dirty="0"/>
-              <a:t>In case the pod was not started, use “</a:t>
-            </a:r>
-            <a:r>
-              <a:rPr lang="en-US" dirty="0" err="1"/>
+              <a:rPr lang="en-US" baseline="0" dirty="0"/>
+              <a:t>Use the </a:t>
+            </a:r>
+            <a:r>
+              <a:rPr lang="en-US" baseline="0" dirty="0" err="1"/>
+              <a:t>crashloop</a:t>
+            </a:r>
+            <a:r>
+              <a:rPr lang="en-US" baseline="0" dirty="0"/>
+              <a:t> and </a:t>
+            </a:r>
+            <a:r>
+              <a:rPr lang="en-US" baseline="0" dirty="0" err="1"/>
+              <a:t>app_failure</a:t>
+            </a:r>
+            <a:r>
+              <a:rPr lang="en-US" baseline="0" dirty="0"/>
+              <a:t> demos </a:t>
+            </a:r>
+          </a:p>
+          <a:p>
+            <a:pPr marL="285750" marR="0" lvl="0" indent="-285750" algn="l" defTabSz="1088776" rtl="0" eaLnBrk="1" fontAlgn="auto" latinLnBrk="0" hangingPunct="1">
+              <a:lnSpc>
+                <a:spcPct val="100000"/>
+              </a:lnSpc>
+              <a:spcBef>
+                <a:spcPts val="0"/>
+              </a:spcBef>
+              <a:spcAft>
+                <a:spcPts val="0"/>
+              </a:spcAft>
+              <a:buClrTx/>
+              <a:buSzTx/>
+              <a:buFontTx/>
+              <a:buChar char="-"/>
+              <a:tabLst/>
+              <a:defRPr/>
+            </a:pPr>
+            <a:r>
+              <a:rPr lang="en-US" baseline="0" dirty="0" err="1"/>
+              <a:t>Crashloop</a:t>
+            </a:r>
+            <a:r>
+              <a:rPr lang="en-US" baseline="0" dirty="0"/>
+              <a:t>:</a:t>
+            </a:r>
+          </a:p>
+          <a:p>
+            <a:pPr marL="465750" marR="0" lvl="1" indent="-285750" algn="l" defTabSz="1088776" rtl="0" eaLnBrk="1" fontAlgn="auto" latinLnBrk="0" hangingPunct="1">
+              <a:lnSpc>
+                <a:spcPct val="100000"/>
+              </a:lnSpc>
+              <a:spcBef>
+                <a:spcPts val="0"/>
+              </a:spcBef>
+              <a:spcAft>
+                <a:spcPts val="0"/>
+              </a:spcAft>
+              <a:buClrTx/>
+              <a:buSzTx/>
+              <a:buFontTx/>
+              <a:buChar char="-"/>
+              <a:tabLst/>
+              <a:defRPr/>
+            </a:pPr>
+            <a:r>
+              <a:rPr lang="en-US" baseline="0" dirty="0"/>
+              <a:t>Show the </a:t>
+            </a:r>
+            <a:r>
+              <a:rPr lang="en-US" baseline="0" dirty="0" err="1"/>
+              <a:t>yaml</a:t>
+            </a:r>
+            <a:r>
+              <a:rPr lang="en-US" baseline="0" dirty="0"/>
+              <a:t> file</a:t>
+            </a:r>
+          </a:p>
+          <a:p>
+            <a:pPr marL="465750" marR="0" lvl="1" indent="-285750" algn="l" defTabSz="1088776" rtl="0" eaLnBrk="1" fontAlgn="auto" latinLnBrk="0" hangingPunct="1">
+              <a:lnSpc>
+                <a:spcPct val="100000"/>
+              </a:lnSpc>
+              <a:spcBef>
+                <a:spcPts val="0"/>
+              </a:spcBef>
+              <a:spcAft>
+                <a:spcPts val="0"/>
+              </a:spcAft>
+              <a:buClrTx/>
+              <a:buSzTx/>
+              <a:buFontTx/>
+              <a:buChar char="-"/>
+              <a:tabLst/>
+              <a:defRPr/>
+            </a:pPr>
+            <a:r>
+              <a:rPr lang="en-US" baseline="0" dirty="0"/>
+              <a:t>Run the pod and show the restart counter &amp; error message with </a:t>
+            </a:r>
+            <a:r>
+              <a:rPr lang="en-US" baseline="0" dirty="0" err="1"/>
               <a:t>kubectl</a:t>
             </a:r>
             <a:r>
-              <a:rPr lang="en-US" dirty="0"/>
-              <a:t> describe pod &lt;name&gt;” to look at events. They usually contain a hint about what went wrong</a:t>
-            </a:r>
-          </a:p>
-          <a:p>
-            <a:pPr marL="342900" indent="-342900">
-              <a:buAutoNum type="arabicParenR"/>
+              <a:rPr lang="en-US" baseline="0" dirty="0"/>
+              <a:t> get pods</a:t>
+            </a:r>
+          </a:p>
+          <a:p>
+            <a:pPr marL="465750" marR="0" lvl="1" indent="-285750" algn="l" defTabSz="1088776" rtl="0" eaLnBrk="1" fontAlgn="auto" latinLnBrk="0" hangingPunct="1">
+              <a:lnSpc>
+                <a:spcPct val="100000"/>
+              </a:lnSpc>
+              <a:spcBef>
+                <a:spcPts val="0"/>
+              </a:spcBef>
+              <a:spcAft>
+                <a:spcPts val="0"/>
+              </a:spcAft>
+              <a:buClrTx/>
+              <a:buSzTx/>
+              <a:buFontTx/>
+              <a:buChar char="-"/>
+              <a:tabLst/>
+              <a:defRPr/>
             </a:pPr>
-            <a:endParaRPr lang="en-US" dirty="0"/>
+            <a:r>
+              <a:rPr lang="en-US" baseline="0" dirty="0"/>
+              <a:t>Show the logs of the pod </a:t>
+            </a:r>
+            <a:r>
+              <a:rPr lang="en-US" baseline="0" dirty="0">
+                <a:sym typeface="Wingdings" panose="05000000000000000000" pitchFamily="2" charset="2"/>
+              </a:rPr>
+              <a:t> expected output: /bin/</a:t>
+            </a:r>
+            <a:r>
+              <a:rPr lang="en-US" baseline="0" dirty="0" err="1">
+                <a:sym typeface="Wingdings" panose="05000000000000000000" pitchFamily="2" charset="2"/>
+              </a:rPr>
+              <a:t>sh</a:t>
+            </a:r>
+            <a:r>
+              <a:rPr lang="en-US" baseline="0" dirty="0">
+                <a:sym typeface="Wingdings" panose="05000000000000000000" pitchFamily="2" charset="2"/>
+              </a:rPr>
+              <a:t>: no-such-</a:t>
+            </a:r>
+            <a:r>
+              <a:rPr lang="en-US" baseline="0" dirty="0" err="1">
+                <a:sym typeface="Wingdings" panose="05000000000000000000" pitchFamily="2" charset="2"/>
+              </a:rPr>
+              <a:t>cmd</a:t>
+            </a:r>
+            <a:r>
+              <a:rPr lang="en-US" baseline="0" dirty="0">
+                <a:sym typeface="Wingdings" panose="05000000000000000000" pitchFamily="2" charset="2"/>
+              </a:rPr>
+              <a:t>: not found</a:t>
+            </a:r>
+            <a:endParaRPr lang="en-US" baseline="0" dirty="0"/>
+          </a:p>
+          <a:p>
+            <a:pPr marL="285750" marR="0" lvl="0" indent="-285750" algn="l" defTabSz="1088776" rtl="0" eaLnBrk="1" fontAlgn="auto" latinLnBrk="0" hangingPunct="1">
+              <a:lnSpc>
+                <a:spcPct val="100000"/>
+              </a:lnSpc>
+              <a:spcBef>
+                <a:spcPts val="0"/>
+              </a:spcBef>
+              <a:spcAft>
+                <a:spcPts val="0"/>
+              </a:spcAft>
+              <a:buClrTx/>
+              <a:buSzTx/>
+              <a:buFontTx/>
+              <a:buChar char="-"/>
+              <a:tabLst/>
+              <a:defRPr/>
+            </a:pPr>
+            <a:r>
+              <a:rPr lang="en-US" baseline="0" dirty="0"/>
+              <a:t>App failure:</a:t>
+            </a:r>
+          </a:p>
+          <a:p>
+            <a:pPr marL="465750" marR="0" lvl="1" indent="-285750" algn="l" defTabSz="1088776" rtl="0" eaLnBrk="1" fontAlgn="auto" latinLnBrk="0" hangingPunct="1">
+              <a:lnSpc>
+                <a:spcPct val="100000"/>
+              </a:lnSpc>
+              <a:spcBef>
+                <a:spcPts val="0"/>
+              </a:spcBef>
+              <a:spcAft>
+                <a:spcPts val="0"/>
+              </a:spcAft>
+              <a:buClrTx/>
+              <a:buSzTx/>
+              <a:buFontTx/>
+              <a:buChar char="-"/>
+              <a:tabLst/>
+              <a:defRPr/>
+            </a:pPr>
+            <a:r>
+              <a:rPr lang="en-US" baseline="0" dirty="0"/>
+              <a:t>Show the </a:t>
+            </a:r>
+            <a:r>
+              <a:rPr lang="en-US" baseline="0" dirty="0" err="1"/>
+              <a:t>yaml</a:t>
+            </a:r>
+            <a:r>
+              <a:rPr lang="en-US" baseline="0" dirty="0"/>
+              <a:t> file</a:t>
+            </a:r>
+          </a:p>
+          <a:p>
+            <a:pPr marL="465750" marR="0" lvl="1" indent="-285750" algn="l" defTabSz="1088776" rtl="0" eaLnBrk="1" fontAlgn="auto" latinLnBrk="0" hangingPunct="1">
+              <a:lnSpc>
+                <a:spcPct val="100000"/>
+              </a:lnSpc>
+              <a:spcBef>
+                <a:spcPts val="0"/>
+              </a:spcBef>
+              <a:spcAft>
+                <a:spcPts val="0"/>
+              </a:spcAft>
+              <a:buClrTx/>
+              <a:buSzTx/>
+              <a:buFontTx/>
+              <a:buChar char="-"/>
+              <a:tabLst/>
+              <a:defRPr/>
+            </a:pPr>
+            <a:r>
+              <a:rPr lang="en-US" baseline="0" dirty="0"/>
+              <a:t>Start the pod and show it is running</a:t>
+            </a:r>
+          </a:p>
+          <a:p>
+            <a:pPr marL="465750" marR="0" lvl="1" indent="-285750" algn="l" defTabSz="1088776" rtl="0" eaLnBrk="1" fontAlgn="auto" latinLnBrk="0" hangingPunct="1">
+              <a:lnSpc>
+                <a:spcPct val="100000"/>
+              </a:lnSpc>
+              <a:spcBef>
+                <a:spcPts val="0"/>
+              </a:spcBef>
+              <a:spcAft>
+                <a:spcPts val="0"/>
+              </a:spcAft>
+              <a:buClrTx/>
+              <a:buSzTx/>
+              <a:buFontTx/>
+              <a:buChar char="-"/>
+              <a:tabLst/>
+              <a:defRPr/>
+            </a:pPr>
+            <a:r>
+              <a:rPr lang="en-US" baseline="0" dirty="0"/>
+              <a:t>Use port forward to get to the index.html page (</a:t>
+            </a:r>
+            <a:r>
+              <a:rPr lang="en-US" baseline="0" dirty="0" err="1"/>
+              <a:t>kubectl</a:t>
+            </a:r>
+            <a:r>
+              <a:rPr lang="en-US" baseline="0" dirty="0"/>
+              <a:t> port-forward app-failure 8080:80)</a:t>
+            </a:r>
+          </a:p>
+          <a:p>
+            <a:pPr marL="465750" marR="0" lvl="1" indent="-285750" algn="l" defTabSz="1088776" rtl="0" eaLnBrk="1" fontAlgn="auto" latinLnBrk="0" hangingPunct="1">
+              <a:lnSpc>
+                <a:spcPct val="100000"/>
+              </a:lnSpc>
+              <a:spcBef>
+                <a:spcPts val="0"/>
+              </a:spcBef>
+              <a:spcAft>
+                <a:spcPts val="0"/>
+              </a:spcAft>
+              <a:buClrTx/>
+              <a:buSzTx/>
+              <a:buFontTx/>
+              <a:buChar char="-"/>
+              <a:tabLst/>
+              <a:defRPr/>
+            </a:pPr>
+            <a:r>
+              <a:rPr lang="en-US" baseline="0" dirty="0"/>
+              <a:t>Show the error message with </a:t>
+            </a:r>
+            <a:r>
+              <a:rPr lang="en-US" baseline="0" dirty="0" err="1"/>
+              <a:t>kubectl</a:t>
+            </a:r>
+            <a:r>
+              <a:rPr lang="en-US" baseline="0" dirty="0"/>
+              <a:t> logs … &amp; exec into the pod. Show the directory without the index.html file</a:t>
+            </a:r>
+          </a:p>
+          <a:p>
+            <a:pPr marL="465750" marR="0" lvl="1" indent="-285750" algn="l" defTabSz="1088776" rtl="0" eaLnBrk="1" fontAlgn="auto" latinLnBrk="0" hangingPunct="1">
+              <a:lnSpc>
+                <a:spcPct val="100000"/>
+              </a:lnSpc>
+              <a:spcBef>
+                <a:spcPts val="0"/>
+              </a:spcBef>
+              <a:spcAft>
+                <a:spcPts val="0"/>
+              </a:spcAft>
+              <a:buClrTx/>
+              <a:buSzTx/>
+              <a:buFontTx/>
+              <a:buChar char="-"/>
+              <a:tabLst/>
+              <a:defRPr/>
+            </a:pPr>
+            <a:r>
+              <a:rPr lang="en-US" baseline="0" dirty="0"/>
+              <a:t>Explanation: upon start with a default configuration </a:t>
+            </a:r>
+            <a:r>
+              <a:rPr lang="en-US" baseline="0" dirty="0" err="1"/>
+              <a:t>nginx</a:t>
+            </a:r>
+            <a:r>
+              <a:rPr lang="en-US" baseline="0" dirty="0"/>
+              <a:t> looks at a /</a:t>
+            </a:r>
+            <a:r>
+              <a:rPr lang="en-US" baseline="0" dirty="0" err="1"/>
+              <a:t>usr</a:t>
+            </a:r>
+            <a:r>
+              <a:rPr lang="en-US" baseline="0" dirty="0"/>
+              <a:t>/share/</a:t>
+            </a:r>
+            <a:r>
+              <a:rPr lang="en-US" baseline="0" dirty="0" err="1"/>
+              <a:t>nginx</a:t>
+            </a:r>
+            <a:r>
+              <a:rPr lang="en-US" baseline="0" dirty="0"/>
+              <a:t>/html for an index.html file. If this file is not found, </a:t>
+            </a:r>
+            <a:r>
+              <a:rPr lang="en-US" baseline="0" dirty="0" err="1"/>
+              <a:t>nginx</a:t>
+            </a:r>
+            <a:r>
+              <a:rPr lang="en-US" baseline="0" dirty="0"/>
+              <a:t> attempts a “list directory” action, which is also </a:t>
+            </a:r>
+            <a:r>
+              <a:rPr lang="en-US" b="1" baseline="0" dirty="0"/>
+              <a:t>forbidden </a:t>
+            </a:r>
+            <a:r>
+              <a:rPr lang="en-US" b="0" baseline="0" dirty="0"/>
+              <a:t>in the default configuration.</a:t>
+            </a:r>
+            <a:endParaRPr lang="en-US" b="1" baseline="0" dirty="0"/>
+          </a:p>
+          <a:p>
+            <a:pPr marL="0" marR="0" lvl="0" indent="0" algn="l" defTabSz="1088776" rtl="0" eaLnBrk="1" fontAlgn="auto" latinLnBrk="0" hangingPunct="1">
+              <a:lnSpc>
+                <a:spcPct val="100000"/>
+              </a:lnSpc>
+              <a:spcBef>
+                <a:spcPts val="0"/>
+              </a:spcBef>
+              <a:spcAft>
+                <a:spcPts val="0"/>
+              </a:spcAft>
+              <a:buClrTx/>
+              <a:buSzTx/>
+              <a:buFontTx/>
+              <a:buNone/>
+              <a:tabLst/>
+              <a:defRPr/>
+            </a:pPr>
+            <a:endParaRPr lang="en-US" baseline="0" dirty="0"/>
+          </a:p>
+          <a:p>
+            <a:pPr marL="0" marR="0" lvl="0" indent="0" algn="l" defTabSz="1088776" rtl="0" eaLnBrk="1" fontAlgn="auto" latinLnBrk="0" hangingPunct="1">
+              <a:lnSpc>
+                <a:spcPct val="100000"/>
+              </a:lnSpc>
+              <a:spcBef>
+                <a:spcPts val="0"/>
+              </a:spcBef>
+              <a:spcAft>
+                <a:spcPts val="0"/>
+              </a:spcAft>
+              <a:buClrTx/>
+              <a:buSzTx/>
+              <a:buFontTx/>
+              <a:buNone/>
+              <a:tabLst/>
+              <a:defRPr/>
+            </a:pPr>
+            <a:r>
+              <a:rPr lang="en-US" baseline="0" dirty="0"/>
+              <a:t>These 2 strategies can be used for application debugging. Usually issues are not connected to the cluster itself.</a:t>
+            </a:r>
           </a:p>
         </p:txBody>
       </p:sp>
@@ -1282,7 +2098,7 @@
     </p:spTree>
     <p:extLst>
       <p:ext uri="{BB962C8B-B14F-4D97-AF65-F5344CB8AC3E}">
-        <p14:creationId xmlns:p14="http://schemas.microsoft.com/office/powerpoint/2010/main" val="2666865443"/>
+        <p14:creationId xmlns:p14="http://schemas.microsoft.com/office/powerpoint/2010/main" val="3277023380"/>
       </p:ext>
     </p:extLst>
   </p:cSld>
@@ -1338,33 +2154,8 @@
           <a:p>
             <a:r>
               <a:rPr lang="en-US" dirty="0"/>
-              <a:t>There are various reasons why a service may not be working properly. </a:t>
-            </a:r>
-            <a:r>
-              <a:rPr lang="en-US" dirty="0" err="1"/>
-              <a:t>Kube-dns</a:t>
-            </a:r>
-            <a:r>
-              <a:rPr lang="en-US" dirty="0"/>
-              <a:t> &amp; </a:t>
-            </a:r>
-            <a:r>
-              <a:rPr lang="en-US" dirty="0" err="1"/>
-              <a:t>kube</a:t>
-            </a:r>
-            <a:r>
-              <a:rPr lang="en-US" dirty="0"/>
-              <a:t>-proxy might have issues but most likely the issues during a training are user-specific.</a:t>
-            </a:r>
-          </a:p>
-          <a:p>
-            <a:r>
-              <a:rPr lang="en-US" dirty="0"/>
-              <a:t>So here are a few ideas how to debug a service based on the “describe command”</a:t>
-            </a:r>
-          </a:p>
-          <a:p>
-            <a:endParaRPr lang="en-US" dirty="0"/>
+              <a:t>In case something does not work as expected:</a:t>
+            </a:r>
           </a:p>
           <a:p>
             <a:pPr marL="342900" indent="-342900">
@@ -1372,24 +2163,7 @@
             </a:pPr>
             <a:r>
               <a:rPr lang="en-US" dirty="0"/>
-              <a:t>Are you using the correct set of labels (</a:t>
-            </a:r>
-            <a:r>
-              <a:rPr lang="en-US" dirty="0" err="1"/>
-              <a:t>key:value</a:t>
-            </a:r>
-            <a:r>
-              <a:rPr lang="en-US" dirty="0"/>
-              <a:t> pairs) to select pods that should be managed by the service?</a:t>
-            </a:r>
-          </a:p>
-          <a:p>
-            <a:pPr marL="180000" lvl="1" indent="0">
-              <a:buNone/>
-            </a:pPr>
-            <a:r>
-              <a:rPr lang="en-US" dirty="0"/>
-              <a:t>    Test with “</a:t>
+              <a:t>In case the pod was not started, use “</a:t>
             </a:r>
             <a:r>
               <a:rPr lang="en-US" dirty="0" err="1"/>
@@ -1397,26 +2171,14 @@
             </a:r>
             <a:r>
               <a:rPr lang="en-US" dirty="0"/>
-              <a:t> get pods –l &lt;key&gt;=&lt;value&gt;” as described in the selector of the service.</a:t>
+              <a:t> describe pod &lt;name&gt;” to look at events. They usually contain a hint about what went wrong</a:t>
             </a:r>
           </a:p>
           <a:p>
             <a:pPr marL="342900" indent="-342900">
               <a:buAutoNum type="arabicParenR"/>
             </a:pPr>
-            <a:r>
-              <a:rPr lang="en-US" dirty="0"/>
-              <a:t>Are you targeting the correct port? The target port is the port specified in the pod spec.</a:t>
-            </a:r>
-          </a:p>
-          <a:p>
-            <a:pPr marL="342900" indent="-342900">
-              <a:buAutoNum type="arabicParenR"/>
-            </a:pPr>
-            <a:r>
-              <a:rPr lang="en-US" dirty="0"/>
-              <a:t>Are there any pods available? The “Endpoints” part of the description lists all the IP addresses of the pods identified by the label. Run the query with from step 1 with “-o wide” and check for the IP addresses. If there are no endpoints listed, either the label/selector part is wrong or there are simply no pods (e.g. because someone deleted the deployment)</a:t>
-            </a:r>
+            <a:endParaRPr lang="en-US" dirty="0"/>
           </a:p>
         </p:txBody>
       </p:sp>
@@ -1447,7 +2209,7 @@
     </p:spTree>
     <p:extLst>
       <p:ext uri="{BB962C8B-B14F-4D97-AF65-F5344CB8AC3E}">
-        <p14:creationId xmlns:p14="http://schemas.microsoft.com/office/powerpoint/2010/main" val="1210700300"/>
+        <p14:creationId xmlns:p14="http://schemas.microsoft.com/office/powerpoint/2010/main" val="2666865443"/>
       </p:ext>
     </p:extLst>
   </p:cSld>
@@ -1476,6 +2238,117 @@
       </p:grpSpPr>
       <p:sp>
         <p:nvSpPr>
+          <p:cNvPr id="2" name="Slide Image Placeholder 1"/>
+          <p:cNvSpPr>
+            <a:spLocks noGrp="1" noRot="1" noChangeAspect="1"/>
+          </p:cNvSpPr>
+          <p:nvPr>
+            <p:ph type="sldImg"/>
+          </p:nvPr>
+        </p:nvSpPr>
+        <p:spPr/>
+      </p:sp>
+      <p:sp>
+        <p:nvSpPr>
+          <p:cNvPr id="3" name="Notes Placeholder 2"/>
+          <p:cNvSpPr>
+            <a:spLocks noGrp="1"/>
+          </p:cNvSpPr>
+          <p:nvPr>
+            <p:ph type="body" idx="1"/>
+          </p:nvPr>
+        </p:nvSpPr>
+        <p:spPr/>
+        <p:txBody>
+          <a:bodyPr/>
+          <a:lstStyle/>
+          <a:p>
+            <a:r>
+              <a:rPr lang="en-US" dirty="0"/>
+              <a:t>There are various reasons why a service may not be working properly. </a:t>
+            </a:r>
+            <a:r>
+              <a:rPr lang="en-US" dirty="0" err="1"/>
+              <a:t>Kube-dns</a:t>
+            </a:r>
+            <a:r>
+              <a:rPr lang="en-US" dirty="0"/>
+              <a:t> &amp; </a:t>
+            </a:r>
+            <a:r>
+              <a:rPr lang="en-US" dirty="0" err="1"/>
+              <a:t>kube</a:t>
+            </a:r>
+            <a:r>
+              <a:rPr lang="en-US" dirty="0"/>
+              <a:t>-proxy might have issues but most likely the issues during a training are user-specific.</a:t>
+            </a:r>
+          </a:p>
+          <a:p>
+            <a:r>
+              <a:rPr lang="en-US" dirty="0"/>
+              <a:t>So here are a few ideas how to debug a service based on the “describe command”</a:t>
+            </a:r>
+          </a:p>
+          <a:p>
+            <a:endParaRPr lang="en-US" dirty="0"/>
+          </a:p>
+          <a:p>
+            <a:pPr marL="342900" indent="-342900">
+              <a:buAutoNum type="arabicParenR"/>
+            </a:pPr>
+            <a:r>
+              <a:rPr lang="en-US" dirty="0"/>
+              <a:t>Are you using the correct set of labels (</a:t>
+            </a:r>
+            <a:r>
+              <a:rPr lang="en-US" dirty="0" err="1"/>
+              <a:t>key:value</a:t>
+            </a:r>
+            <a:r>
+              <a:rPr lang="en-US" dirty="0"/>
+              <a:t> pairs) to select pods that should be managed by the service?</a:t>
+            </a:r>
+          </a:p>
+          <a:p>
+            <a:pPr marL="180000" lvl="1" indent="0">
+              <a:buNone/>
+            </a:pPr>
+            <a:r>
+              <a:rPr lang="en-US" dirty="0"/>
+              <a:t>    Test with “</a:t>
+            </a:r>
+            <a:r>
+              <a:rPr lang="en-US" dirty="0" err="1"/>
+              <a:t>kubectl</a:t>
+            </a:r>
+            <a:r>
+              <a:rPr lang="en-US" dirty="0"/>
+              <a:t> get pods –l &lt;key&gt;=&lt;value&gt;” as described in the selector of the service.</a:t>
+            </a:r>
+          </a:p>
+          <a:p>
+            <a:pPr marL="342900" indent="-342900">
+              <a:buAutoNum type="arabicParenR"/>
+            </a:pPr>
+            <a:r>
+              <a:rPr lang="en-US" dirty="0"/>
+              <a:t>Are you targeting the correct port? The target port is the port specified in the pod spec.</a:t>
+            </a:r>
+          </a:p>
+          <a:p>
+            <a:pPr marL="342900" indent="-342900">
+              <a:buAutoNum type="arabicParenR"/>
+            </a:pPr>
+            <a:r>
+              <a:rPr lang="en-US" dirty="0"/>
+              <a:t>Are there any pods available? The “Endpoints” part of the description lists all the IP addresses of the pods identified by the label. Run the query with from step 1 with “-o wide” and check for the IP addresses. If there are no endpoints listed, either the label/selector part is wrong or there are simply no pods (e.g. because someone deleted the deployment)</a:t>
+            </a:r>
+          </a:p>
+        </p:txBody>
+      </p:sp>
+      <p:sp>
+        <p:nvSpPr>
           <p:cNvPr id="4" name="Slide Number Placeholder 3"/>
           <p:cNvSpPr>
             <a:spLocks noGrp="1"/>
@@ -1490,56 +2363,18 @@
           <a:lstStyle/>
           <a:p>
             <a:fld id="{7D8C2C35-2B8A-446E-BEC0-FD36716C29AC}" type="slidenum">
-              <a:rPr lang="en-US" smtClean="0"/>
+              <a:rPr lang="de-DE" smtClean="0"/>
               <a:pPr/>
               <a:t>9</a:t>
             </a:fld>
-            <a:endParaRPr lang="en-US" dirty="0"/>
-          </a:p>
-        </p:txBody>
-      </p:sp>
-      <p:sp>
-        <p:nvSpPr>
-          <p:cNvPr id="6" name="Slide Image Placeholder 5"/>
-          <p:cNvSpPr>
-            <a:spLocks noGrp="1" noRot="1" noChangeAspect="1"/>
-          </p:cNvSpPr>
-          <p:nvPr>
-            <p:ph type="sldImg"/>
-          </p:nvPr>
-        </p:nvSpPr>
-        <p:spPr>
-          <a:xfrm>
-            <a:off x="547688" y="612775"/>
-            <a:ext cx="5762625" cy="3241675"/>
-          </a:xfrm>
-        </p:spPr>
-      </p:sp>
-      <p:sp>
-        <p:nvSpPr>
-          <p:cNvPr id="7" name="Notes Placeholder 6"/>
-          <p:cNvSpPr>
-            <a:spLocks noGrp="1"/>
-          </p:cNvSpPr>
-          <p:nvPr>
-            <p:ph type="body" idx="1"/>
-          </p:nvPr>
-        </p:nvSpPr>
-        <p:spPr/>
-        <p:txBody>
-          <a:bodyPr>
-            <a:normAutofit/>
-          </a:bodyPr>
-          <a:lstStyle/>
-          <a:p>
-            <a:endParaRPr lang="en-US" dirty="0"/>
+            <a:endParaRPr lang="de-DE" dirty="0"/>
           </a:p>
         </p:txBody>
       </p:sp>
     </p:spTree>
     <p:extLst>
       <p:ext uri="{BB962C8B-B14F-4D97-AF65-F5344CB8AC3E}">
-        <p14:creationId xmlns:p14="http://schemas.microsoft.com/office/powerpoint/2010/main" val="2544264309"/>
+        <p14:creationId xmlns:p14="http://schemas.microsoft.com/office/powerpoint/2010/main" val="1210700300"/>
       </p:ext>
     </p:extLst>
   </p:cSld>
@@ -14976,6 +15811,114 @@
 </p:sld>
 </file>
 
+<file path=ppt/slides/slide10.xml><?xml version="1.0" encoding="utf-8"?>
+<p:sld xmlns:a="http://schemas.openxmlformats.org/drawingml/2006/main" xmlns:r="http://schemas.openxmlformats.org/officeDocument/2006/relationships" xmlns:p="http://schemas.openxmlformats.org/presentationml/2006/main">
+  <p:cSld>
+    <p:spTree>
+      <p:nvGrpSpPr>
+        <p:cNvPr id="1" name=""/>
+        <p:cNvGrpSpPr/>
+        <p:nvPr/>
+      </p:nvGrpSpPr>
+      <p:grpSpPr>
+        <a:xfrm>
+          <a:off x="0" y="0"/>
+          <a:ext cx="0" cy="0"/>
+          <a:chOff x="0" y="0"/>
+          <a:chExt cx="0" cy="0"/>
+        </a:xfrm>
+      </p:grpSpPr>
+      <p:sp>
+        <p:nvSpPr>
+          <p:cNvPr id="3" name="Title 2"/>
+          <p:cNvSpPr>
+            <a:spLocks noGrp="1"/>
+          </p:cNvSpPr>
+          <p:nvPr>
+            <p:ph type="title"/>
+          </p:nvPr>
+        </p:nvSpPr>
+        <p:spPr/>
+        <p:txBody>
+          <a:bodyPr/>
+          <a:lstStyle/>
+          <a:p>
+            <a:r>
+              <a:rPr lang="en-US" dirty="0"/>
+              <a:t>Demo</a:t>
+            </a:r>
+          </a:p>
+        </p:txBody>
+      </p:sp>
+      <p:pic>
+        <p:nvPicPr>
+          <p:cNvPr id="4" name="Picture 3">
+            <a:extLst>
+              <a:ext uri="{FF2B5EF4-FFF2-40B4-BE49-F238E27FC236}">
+                <a16:creationId xmlns:a16="http://schemas.microsoft.com/office/drawing/2014/main" id="{667C7630-D1BA-44ED-BD0C-E0F24DE56B91}"/>
+              </a:ext>
+            </a:extLst>
+          </p:cNvPr>
+          <p:cNvPicPr>
+            <a:picLocks noChangeAspect="1"/>
+          </p:cNvPicPr>
+          <p:nvPr/>
+        </p:nvPicPr>
+        <p:blipFill>
+          <a:blip r:embed="rId3"/>
+          <a:stretch>
+            <a:fillRect/>
+          </a:stretch>
+        </p:blipFill>
+        <p:spPr>
+          <a:xfrm>
+            <a:off x="3849419" y="1181180"/>
+            <a:ext cx="4495640" cy="4495640"/>
+          </a:xfrm>
+          <a:prstGeom prst="rect">
+            <a:avLst/>
+          </a:prstGeom>
+        </p:spPr>
+      </p:pic>
+    </p:spTree>
+    <p:extLst>
+      <p:ext uri="{BB962C8B-B14F-4D97-AF65-F5344CB8AC3E}">
+        <p14:creationId xmlns:p14="http://schemas.microsoft.com/office/powerpoint/2010/main" val="157011941"/>
+      </p:ext>
+    </p:extLst>
+  </p:cSld>
+  <p:clrMapOvr>
+    <a:masterClrMapping/>
+  </p:clrMapOvr>
+</p:sld>
+</file>
+
+<file path=ppt/slides/slide11.xml><?xml version="1.0" encoding="utf-8"?>
+<p:sld xmlns:a="http://schemas.openxmlformats.org/drawingml/2006/main" xmlns:r="http://schemas.openxmlformats.org/officeDocument/2006/relationships" xmlns:p="http://schemas.openxmlformats.org/presentationml/2006/main" show="0">
+  <p:cSld>
+    <p:spTree>
+      <p:nvGrpSpPr>
+        <p:cNvPr id="1" name=""/>
+        <p:cNvGrpSpPr/>
+        <p:nvPr/>
+      </p:nvGrpSpPr>
+      <p:grpSpPr>
+        <a:xfrm>
+          <a:off x="0" y="0"/>
+          <a:ext cx="0" cy="0"/>
+          <a:chOff x="0" y="0"/>
+          <a:chExt cx="0" cy="0"/>
+        </a:xfrm>
+      </p:grpSpPr>
+    </p:spTree>
+  </p:cSld>
+  <p:clrMapOvr>
+    <a:masterClrMapping/>
+  </p:clrMapOvr>
+  <p:transition spd="med"/>
+</p:sld>
+</file>
+
 <file path=ppt/slides/slide2.xml><?xml version="1.0" encoding="utf-8"?>
 <p:sld xmlns:a="http://schemas.openxmlformats.org/drawingml/2006/main" xmlns:r="http://schemas.openxmlformats.org/officeDocument/2006/relationships" xmlns:p="http://schemas.openxmlformats.org/presentationml/2006/main">
   <p:cSld>
@@ -16702,6 +17645,88 @@
       </p:grpSpPr>
       <p:sp>
         <p:nvSpPr>
+          <p:cNvPr id="3" name="Title 2"/>
+          <p:cNvSpPr>
+            <a:spLocks noGrp="1"/>
+          </p:cNvSpPr>
+          <p:nvPr>
+            <p:ph type="title"/>
+          </p:nvPr>
+        </p:nvSpPr>
+        <p:spPr/>
+        <p:txBody>
+          <a:bodyPr/>
+          <a:lstStyle/>
+          <a:p>
+            <a:r>
+              <a:rPr lang="en-US" dirty="0"/>
+              <a:t>Demo</a:t>
+            </a:r>
+          </a:p>
+        </p:txBody>
+      </p:sp>
+      <p:pic>
+        <p:nvPicPr>
+          <p:cNvPr id="4" name="Picture 3">
+            <a:extLst>
+              <a:ext uri="{FF2B5EF4-FFF2-40B4-BE49-F238E27FC236}">
+                <a16:creationId xmlns:a16="http://schemas.microsoft.com/office/drawing/2014/main" id="{667C7630-D1BA-44ED-BD0C-E0F24DE56B91}"/>
+              </a:ext>
+            </a:extLst>
+          </p:cNvPr>
+          <p:cNvPicPr>
+            <a:picLocks noChangeAspect="1"/>
+          </p:cNvPicPr>
+          <p:nvPr/>
+        </p:nvPicPr>
+        <p:blipFill>
+          <a:blip r:embed="rId3"/>
+          <a:stretch>
+            <a:fillRect/>
+          </a:stretch>
+        </p:blipFill>
+        <p:spPr>
+          <a:xfrm>
+            <a:off x="3849419" y="1181180"/>
+            <a:ext cx="4495640" cy="4495640"/>
+          </a:xfrm>
+          <a:prstGeom prst="rect">
+            <a:avLst/>
+          </a:prstGeom>
+        </p:spPr>
+      </p:pic>
+    </p:spTree>
+    <p:extLst>
+      <p:ext uri="{BB962C8B-B14F-4D97-AF65-F5344CB8AC3E}">
+        <p14:creationId xmlns:p14="http://schemas.microsoft.com/office/powerpoint/2010/main" val="3012707076"/>
+      </p:ext>
+    </p:extLst>
+  </p:cSld>
+  <p:clrMapOvr>
+    <a:masterClrMapping/>
+  </p:clrMapOvr>
+</p:sld>
+</file>
+
+<file path=ppt/slides/slide8.xml><?xml version="1.0" encoding="utf-8"?>
+<p:sld xmlns:a="http://schemas.openxmlformats.org/drawingml/2006/main" xmlns:r="http://schemas.openxmlformats.org/officeDocument/2006/relationships" xmlns:p="http://schemas.openxmlformats.org/presentationml/2006/main">
+  <p:cSld>
+    <p:spTree>
+      <p:nvGrpSpPr>
+        <p:cNvPr id="1" name=""/>
+        <p:cNvGrpSpPr/>
+        <p:nvPr/>
+      </p:nvGrpSpPr>
+      <p:grpSpPr>
+        <a:xfrm>
+          <a:off x="0" y="0"/>
+          <a:ext cx="0" cy="0"/>
+          <a:chOff x="0" y="0"/>
+          <a:chExt cx="0" cy="0"/>
+        </a:xfrm>
+      </p:grpSpPr>
+      <p:sp>
+        <p:nvSpPr>
           <p:cNvPr id="2" name="Title 1">
             <a:extLst>
               <a:ext uri="{FF2B5EF4-FFF2-40B4-BE49-F238E27FC236}">
@@ -17216,7 +18241,7 @@
 </p:sld>
 </file>
 
-<file path=ppt/slides/slide8.xml><?xml version="1.0" encoding="utf-8"?>
+<file path=ppt/slides/slide9.xml><?xml version="1.0" encoding="utf-8"?>
 <p:sld xmlns:a="http://schemas.openxmlformats.org/drawingml/2006/main" xmlns:r="http://schemas.openxmlformats.org/officeDocument/2006/relationships" xmlns:p="http://schemas.openxmlformats.org/presentationml/2006/main">
   <p:cSld>
     <p:spTree>
@@ -17741,32 +18766,6 @@
   <p:clrMapOvr>
     <a:masterClrMapping/>
   </p:clrMapOvr>
-</p:sld>
-</file>
-
-<file path=ppt/slides/slide9.xml><?xml version="1.0" encoding="utf-8"?>
-<p:sld xmlns:a="http://schemas.openxmlformats.org/drawingml/2006/main" xmlns:r="http://schemas.openxmlformats.org/officeDocument/2006/relationships" xmlns:p="http://schemas.openxmlformats.org/presentationml/2006/main" show="0">
-  <p:cSld>
-    <p:spTree>
-      <p:nvGrpSpPr>
-        <p:cNvPr id="1" name=""/>
-        <p:cNvGrpSpPr/>
-        <p:nvPr/>
-      </p:nvGrpSpPr>
-      <p:grpSpPr>
-        <a:xfrm>
-          <a:off x="0" y="0"/>
-          <a:ext cx="0" cy="0"/>
-          <a:chOff x="0" y="0"/>
-          <a:chExt cx="0" cy="0"/>
-        </a:xfrm>
-      </p:grpSpPr>
-    </p:spTree>
-  </p:cSld>
-  <p:clrMapOvr>
-    <a:masterClrMapping/>
-  </p:clrMapOvr>
-  <p:transition spd="med"/>
 </p:sld>
 </file>
 

</xml_diff>

<commit_message>
link added: 10 most common failures for deployments
</commit_message>
<xml_diff>
--- a/kubernetes/06_troubleshooting.pptx
+++ b/kubernetes/06_troubleshooting.pptx
@@ -897,6 +897,115 @@
               <a:rPr lang="en-US" baseline="0" dirty="0"/>
               <a:t>The IP addresses of the pods and the service endpoints should match</a:t>
             </a:r>
+          </a:p>
+          <a:p>
+            <a:pPr marL="342900" marR="0" lvl="0" indent="-342900" algn="l" defTabSz="1088776" rtl="0" eaLnBrk="1" fontAlgn="auto" latinLnBrk="0" hangingPunct="1">
+              <a:lnSpc>
+                <a:spcPct val="100000"/>
+              </a:lnSpc>
+              <a:spcBef>
+                <a:spcPts val="0"/>
+              </a:spcBef>
+              <a:spcAft>
+                <a:spcPts val="0"/>
+              </a:spcAft>
+              <a:buClrTx/>
+              <a:buSzTx/>
+              <a:buFont typeface="Symbol" panose="05050102010706020507" pitchFamily="18" charset="2"/>
+              <a:buChar char="-"/>
+              <a:tabLst/>
+              <a:defRPr/>
+            </a:pPr>
+            <a:endParaRPr lang="en-US" baseline="0" dirty="0"/>
+          </a:p>
+          <a:p>
+            <a:pPr marL="342900" marR="0" lvl="0" indent="-342900" algn="l" defTabSz="1088776" rtl="0" eaLnBrk="1" fontAlgn="auto" latinLnBrk="0" hangingPunct="1">
+              <a:lnSpc>
+                <a:spcPct val="100000"/>
+              </a:lnSpc>
+              <a:spcBef>
+                <a:spcPts val="0"/>
+              </a:spcBef>
+              <a:spcAft>
+                <a:spcPts val="0"/>
+              </a:spcAft>
+              <a:buClrTx/>
+              <a:buSzTx/>
+              <a:buFont typeface="Symbol" panose="05050102010706020507" pitchFamily="18" charset="2"/>
+              <a:buChar char="-"/>
+              <a:tabLst/>
+              <a:defRPr/>
+            </a:pPr>
+            <a:r>
+              <a:rPr lang="en-US" b="1" baseline="0" dirty="0"/>
+              <a:t>10 most common reasons why k8s deployments fail</a:t>
+            </a:r>
+          </a:p>
+          <a:p>
+            <a:pPr marL="522900" marR="0" lvl="1" indent="-342900" algn="l" defTabSz="1088776" rtl="0" eaLnBrk="1" fontAlgn="auto" latinLnBrk="0" hangingPunct="1">
+              <a:lnSpc>
+                <a:spcPct val="100000"/>
+              </a:lnSpc>
+              <a:spcBef>
+                <a:spcPts val="0"/>
+              </a:spcBef>
+              <a:spcAft>
+                <a:spcPts val="0"/>
+              </a:spcAft>
+              <a:buClrTx/>
+              <a:buSzTx/>
+              <a:buFont typeface="Symbol" panose="05050102010706020507" pitchFamily="18" charset="2"/>
+              <a:buChar char="-"/>
+              <a:tabLst/>
+              <a:defRPr/>
+            </a:pPr>
+            <a:r>
+              <a:rPr lang="en-US" baseline="0" dirty="0"/>
+              <a:t>https://kukulinski.com/10-most-common-reasons-kubernetes-deployments-fail-part-1/</a:t>
+            </a:r>
+          </a:p>
+          <a:p>
+            <a:pPr marL="522900" marR="0" lvl="1" indent="-342900" algn="l" defTabSz="1088776" rtl="0" eaLnBrk="1" fontAlgn="auto" latinLnBrk="0" hangingPunct="1">
+              <a:lnSpc>
+                <a:spcPct val="100000"/>
+              </a:lnSpc>
+              <a:spcBef>
+                <a:spcPts val="0"/>
+              </a:spcBef>
+              <a:spcAft>
+                <a:spcPts val="0"/>
+              </a:spcAft>
+              <a:buClrTx/>
+              <a:buSzTx/>
+              <a:buFont typeface="Symbol" panose="05050102010706020507" pitchFamily="18" charset="2"/>
+              <a:buChar char="-"/>
+              <a:tabLst/>
+              <a:defRPr/>
+            </a:pPr>
+            <a:r>
+              <a:rPr lang="en-US" baseline="0"/>
+              <a:t>https://kukulinski.com/10-most-common-reasons-kubernetes-deployments-fail-part-2/</a:t>
+            </a:r>
+          </a:p>
+          <a:p>
+            <a:pPr marL="342900" marR="0" lvl="0" indent="-342900" algn="l" defTabSz="1088776" rtl="0" eaLnBrk="1" fontAlgn="auto" latinLnBrk="0" hangingPunct="1">
+              <a:lnSpc>
+                <a:spcPct val="100000"/>
+              </a:lnSpc>
+              <a:spcBef>
+                <a:spcPts val="0"/>
+              </a:spcBef>
+              <a:spcAft>
+                <a:spcPts val="0"/>
+              </a:spcAft>
+              <a:buClrTx/>
+              <a:buSzTx/>
+              <a:buFont typeface="Symbol" panose="05050102010706020507" pitchFamily="18" charset="2"/>
+              <a:buChar char="-"/>
+              <a:tabLst/>
+              <a:defRPr/>
+            </a:pPr>
+            <a:endParaRPr lang="en-US" baseline="0" dirty="0"/>
           </a:p>
         </p:txBody>
       </p:sp>

</xml_diff>